<commit_message>
modified 03Brian2-1.pptx, 슬라이드 노트 추가
</commit_message>
<xml_diff>
--- a/cs semina/03Brian2-1.pptx
+++ b/cs semina/03Brian2-1.pptx
@@ -282,7 +282,7 @@
           <a:p>
             <a:fld id="{57764B8E-7EC0-4B59-8DA5-E04CAE3DB5F2}" type="datetimeFigureOut">
               <a:rPr lang="ko-KR" altLang="en-US" smtClean="0"/>
-              <a:t>2024-01-21</a:t>
+              <a:t>2024-01-22</a:t>
             </a:fld>
             <a:endParaRPr lang="ko-KR" altLang="en-US"/>
           </a:p>
@@ -547,6 +547,1195 @@
     </a:lvl9pPr>
   </p:notesStyle>
 </p:notesMaster>
+</file>
+
+<file path=ppt/notesSlides/notesSlide1.xml><?xml version="1.0" encoding="utf-8"?>
+<p:notes xmlns:a="http://schemas.openxmlformats.org/drawingml/2006/main" xmlns:r="http://schemas.openxmlformats.org/officeDocument/2006/relationships" xmlns:p="http://schemas.openxmlformats.org/presentationml/2006/main">
+  <p:cSld>
+    <p:spTree>
+      <p:nvGrpSpPr>
+        <p:cNvPr id="1" name=""/>
+        <p:cNvGrpSpPr/>
+        <p:nvPr/>
+      </p:nvGrpSpPr>
+      <p:grpSpPr>
+        <a:xfrm>
+          <a:off x="0" y="0"/>
+          <a:ext cx="0" cy="0"/>
+          <a:chOff x="0" y="0"/>
+          <a:chExt cx="0" cy="0"/>
+        </a:xfrm>
+      </p:grpSpPr>
+      <p:sp>
+        <p:nvSpPr>
+          <p:cNvPr id="2" name="슬라이드 이미지 개체 틀 1"/>
+          <p:cNvSpPr>
+            <a:spLocks noGrp="1" noRot="1" noChangeAspect="1"/>
+          </p:cNvSpPr>
+          <p:nvPr>
+            <p:ph type="sldImg"/>
+          </p:nvPr>
+        </p:nvSpPr>
+        <p:spPr/>
+      </p:sp>
+      <p:sp>
+        <p:nvSpPr>
+          <p:cNvPr id="3" name="슬라이드 노트 개체 틀 2"/>
+          <p:cNvSpPr>
+            <a:spLocks noGrp="1"/>
+          </p:cNvSpPr>
+          <p:nvPr>
+            <p:ph type="body" idx="1"/>
+          </p:nvPr>
+        </p:nvSpPr>
+        <p:spPr/>
+        <p:txBody>
+          <a:bodyPr/>
+          <a:lstStyle/>
+          <a:p>
+            <a:r>
+              <a:rPr lang="ko-KR" altLang="en-US" dirty="0"/>
+              <a:t>목차</a:t>
+            </a:r>
+          </a:p>
+        </p:txBody>
+      </p:sp>
+      <p:sp>
+        <p:nvSpPr>
+          <p:cNvPr id="4" name="슬라이드 번호 개체 틀 3"/>
+          <p:cNvSpPr>
+            <a:spLocks noGrp="1"/>
+          </p:cNvSpPr>
+          <p:nvPr>
+            <p:ph type="sldNum" sz="quarter" idx="5"/>
+          </p:nvPr>
+        </p:nvSpPr>
+        <p:spPr/>
+        <p:txBody>
+          <a:bodyPr/>
+          <a:lstStyle/>
+          <a:p>
+            <a:fld id="{420F09F9-D812-4758-8566-A65BCCCBDD8F}" type="slidenum">
+              <a:rPr lang="ko-KR" altLang="en-US" smtClean="0"/>
+              <a:t>2</a:t>
+            </a:fld>
+            <a:endParaRPr lang="ko-KR" altLang="en-US"/>
+          </a:p>
+        </p:txBody>
+      </p:sp>
+    </p:spTree>
+    <p:extLst>
+      <p:ext uri="{BB962C8B-B14F-4D97-AF65-F5344CB8AC3E}">
+        <p14:creationId xmlns:p14="http://schemas.microsoft.com/office/powerpoint/2010/main" val="3458881216"/>
+      </p:ext>
+    </p:extLst>
+  </p:cSld>
+  <p:clrMapOvr>
+    <a:masterClrMapping/>
+  </p:clrMapOvr>
+</p:notes>
+</file>
+
+<file path=ppt/notesSlides/notesSlide10.xml><?xml version="1.0" encoding="utf-8"?>
+<p:notes xmlns:a="http://schemas.openxmlformats.org/drawingml/2006/main" xmlns:r="http://schemas.openxmlformats.org/officeDocument/2006/relationships" xmlns:p="http://schemas.openxmlformats.org/presentationml/2006/main">
+  <p:cSld>
+    <p:spTree>
+      <p:nvGrpSpPr>
+        <p:cNvPr id="1" name=""/>
+        <p:cNvGrpSpPr/>
+        <p:nvPr/>
+      </p:nvGrpSpPr>
+      <p:grpSpPr>
+        <a:xfrm>
+          <a:off x="0" y="0"/>
+          <a:ext cx="0" cy="0"/>
+          <a:chOff x="0" y="0"/>
+          <a:chExt cx="0" cy="0"/>
+        </a:xfrm>
+      </p:grpSpPr>
+      <p:sp>
+        <p:nvSpPr>
+          <p:cNvPr id="2" name="슬라이드 이미지 개체 틀 1"/>
+          <p:cNvSpPr>
+            <a:spLocks noGrp="1" noRot="1" noChangeAspect="1"/>
+          </p:cNvSpPr>
+          <p:nvPr>
+            <p:ph type="sldImg"/>
+          </p:nvPr>
+        </p:nvSpPr>
+        <p:spPr/>
+      </p:sp>
+      <p:sp>
+        <p:nvSpPr>
+          <p:cNvPr id="3" name="슬라이드 노트 개체 틀 2"/>
+          <p:cNvSpPr>
+            <a:spLocks noGrp="1"/>
+          </p:cNvSpPr>
+          <p:nvPr>
+            <p:ph type="body" idx="1"/>
+          </p:nvPr>
+        </p:nvSpPr>
+        <p:spPr/>
+        <p:txBody>
+          <a:bodyPr/>
+          <a:lstStyle/>
+          <a:p>
+            <a:r>
+              <a:rPr lang="ko-KR" altLang="en-US" dirty="0"/>
+              <a:t>수치 적분 방법을 명시적으로 정의하는 메소드 속성</a:t>
+            </a:r>
+            <a:r>
+              <a:rPr lang="en-US" altLang="ko-KR" dirty="0"/>
+              <a:t>, </a:t>
+            </a:r>
+            <a:r>
+              <a:rPr lang="ko-KR" altLang="en-US" dirty="0" err="1"/>
+              <a:t>이그젝트는</a:t>
+            </a:r>
+            <a:r>
+              <a:rPr lang="ko-KR" altLang="en-US" dirty="0"/>
+              <a:t> 미분방정식의 해를 정확하게 풀이하겠다는 의미이다</a:t>
+            </a:r>
+            <a:r>
+              <a:rPr lang="en-US" altLang="ko-KR" dirty="0"/>
+              <a:t>.</a:t>
+            </a:r>
+            <a:endParaRPr lang="ko-KR" altLang="en-US" dirty="0"/>
+          </a:p>
+        </p:txBody>
+      </p:sp>
+      <p:sp>
+        <p:nvSpPr>
+          <p:cNvPr id="4" name="슬라이드 번호 개체 틀 3"/>
+          <p:cNvSpPr>
+            <a:spLocks noGrp="1"/>
+          </p:cNvSpPr>
+          <p:nvPr>
+            <p:ph type="sldNum" sz="quarter" idx="5"/>
+          </p:nvPr>
+        </p:nvSpPr>
+        <p:spPr/>
+        <p:txBody>
+          <a:bodyPr/>
+          <a:lstStyle/>
+          <a:p>
+            <a:fld id="{420F09F9-D812-4758-8566-A65BCCCBDD8F}" type="slidenum">
+              <a:rPr lang="ko-KR" altLang="en-US" smtClean="0"/>
+              <a:t>11</a:t>
+            </a:fld>
+            <a:endParaRPr lang="ko-KR" altLang="en-US"/>
+          </a:p>
+        </p:txBody>
+      </p:sp>
+    </p:spTree>
+    <p:extLst>
+      <p:ext uri="{BB962C8B-B14F-4D97-AF65-F5344CB8AC3E}">
+        <p14:creationId xmlns:p14="http://schemas.microsoft.com/office/powerpoint/2010/main" val="620372764"/>
+      </p:ext>
+    </p:extLst>
+  </p:cSld>
+  <p:clrMapOvr>
+    <a:masterClrMapping/>
+  </p:clrMapOvr>
+</p:notes>
+</file>
+
+<file path=ppt/notesSlides/notesSlide2.xml><?xml version="1.0" encoding="utf-8"?>
+<p:notes xmlns:a="http://schemas.openxmlformats.org/drawingml/2006/main" xmlns:r="http://schemas.openxmlformats.org/officeDocument/2006/relationships" xmlns:p="http://schemas.openxmlformats.org/presentationml/2006/main">
+  <p:cSld>
+    <p:spTree>
+      <p:nvGrpSpPr>
+        <p:cNvPr id="1" name=""/>
+        <p:cNvGrpSpPr/>
+        <p:nvPr/>
+      </p:nvGrpSpPr>
+      <p:grpSpPr>
+        <a:xfrm>
+          <a:off x="0" y="0"/>
+          <a:ext cx="0" cy="0"/>
+          <a:chOff x="0" y="0"/>
+          <a:chExt cx="0" cy="0"/>
+        </a:xfrm>
+      </p:grpSpPr>
+      <p:sp>
+        <p:nvSpPr>
+          <p:cNvPr id="2" name="슬라이드 이미지 개체 틀 1"/>
+          <p:cNvSpPr>
+            <a:spLocks noGrp="1" noRot="1" noChangeAspect="1"/>
+          </p:cNvSpPr>
+          <p:nvPr>
+            <p:ph type="sldImg"/>
+          </p:nvPr>
+        </p:nvSpPr>
+        <p:spPr/>
+      </p:sp>
+      <p:sp>
+        <p:nvSpPr>
+          <p:cNvPr id="3" name="슬라이드 노트 개체 틀 2"/>
+          <p:cNvSpPr>
+            <a:spLocks noGrp="1"/>
+          </p:cNvSpPr>
+          <p:nvPr>
+            <p:ph type="body" idx="1"/>
+          </p:nvPr>
+        </p:nvSpPr>
+        <p:spPr/>
+        <p:txBody>
+          <a:bodyPr/>
+          <a:lstStyle/>
+          <a:p>
+            <a:r>
+              <a:rPr lang="ko-KR" altLang="en-US" dirty="0" err="1"/>
+              <a:t>콘다</a:t>
+            </a:r>
+            <a:r>
+              <a:rPr lang="ko-KR" altLang="en-US" dirty="0"/>
+              <a:t> </a:t>
+            </a:r>
+            <a:r>
+              <a:rPr lang="ko-KR" altLang="en-US" dirty="0" err="1"/>
+              <a:t>폴지</a:t>
+            </a:r>
+            <a:r>
+              <a:rPr lang="en-US" altLang="ko-KR" dirty="0"/>
+              <a:t>, </a:t>
+            </a:r>
+            <a:r>
+              <a:rPr lang="ko-KR" altLang="en-US" dirty="0" err="1"/>
+              <a:t>콘다</a:t>
+            </a:r>
+            <a:r>
+              <a:rPr lang="ko-KR" altLang="en-US" dirty="0"/>
+              <a:t> 채널</a:t>
+            </a:r>
+            <a:r>
+              <a:rPr lang="en-US" altLang="ko-KR" dirty="0"/>
+              <a:t>, </a:t>
+            </a:r>
+            <a:r>
+              <a:rPr lang="ko-KR" altLang="en-US" dirty="0"/>
+              <a:t>패키지 자동 설치를 위한 채널이다</a:t>
+            </a:r>
+            <a:r>
+              <a:rPr lang="en-US" altLang="ko-KR" dirty="0"/>
+              <a:t>.</a:t>
+            </a:r>
+          </a:p>
+          <a:p>
+            <a:r>
+              <a:rPr lang="ko-KR" altLang="en-US" dirty="0"/>
+              <a:t>버전</a:t>
+            </a:r>
+          </a:p>
+        </p:txBody>
+      </p:sp>
+      <p:sp>
+        <p:nvSpPr>
+          <p:cNvPr id="4" name="슬라이드 번호 개체 틀 3"/>
+          <p:cNvSpPr>
+            <a:spLocks noGrp="1"/>
+          </p:cNvSpPr>
+          <p:nvPr>
+            <p:ph type="sldNum" sz="quarter" idx="5"/>
+          </p:nvPr>
+        </p:nvSpPr>
+        <p:spPr/>
+        <p:txBody>
+          <a:bodyPr/>
+          <a:lstStyle/>
+          <a:p>
+            <a:fld id="{420F09F9-D812-4758-8566-A65BCCCBDD8F}" type="slidenum">
+              <a:rPr lang="ko-KR" altLang="en-US" smtClean="0"/>
+              <a:t>3</a:t>
+            </a:fld>
+            <a:endParaRPr lang="ko-KR" altLang="en-US"/>
+          </a:p>
+        </p:txBody>
+      </p:sp>
+    </p:spTree>
+    <p:extLst>
+      <p:ext uri="{BB962C8B-B14F-4D97-AF65-F5344CB8AC3E}">
+        <p14:creationId xmlns:p14="http://schemas.microsoft.com/office/powerpoint/2010/main" val="2079030406"/>
+      </p:ext>
+    </p:extLst>
+  </p:cSld>
+  <p:clrMapOvr>
+    <a:masterClrMapping/>
+  </p:clrMapOvr>
+</p:notes>
+</file>
+
+<file path=ppt/notesSlides/notesSlide3.xml><?xml version="1.0" encoding="utf-8"?>
+<p:notes xmlns:a="http://schemas.openxmlformats.org/drawingml/2006/main" xmlns:r="http://schemas.openxmlformats.org/officeDocument/2006/relationships" xmlns:p="http://schemas.openxmlformats.org/presentationml/2006/main">
+  <p:cSld>
+    <p:spTree>
+      <p:nvGrpSpPr>
+        <p:cNvPr id="1" name=""/>
+        <p:cNvGrpSpPr/>
+        <p:nvPr/>
+      </p:nvGrpSpPr>
+      <p:grpSpPr>
+        <a:xfrm>
+          <a:off x="0" y="0"/>
+          <a:ext cx="0" cy="0"/>
+          <a:chOff x="0" y="0"/>
+          <a:chExt cx="0" cy="0"/>
+        </a:xfrm>
+      </p:grpSpPr>
+      <p:sp>
+        <p:nvSpPr>
+          <p:cNvPr id="2" name="슬라이드 이미지 개체 틀 1"/>
+          <p:cNvSpPr>
+            <a:spLocks noGrp="1" noRot="1" noChangeAspect="1"/>
+          </p:cNvSpPr>
+          <p:nvPr>
+            <p:ph type="sldImg"/>
+          </p:nvPr>
+        </p:nvSpPr>
+        <p:spPr/>
+      </p:sp>
+      <p:sp>
+        <p:nvSpPr>
+          <p:cNvPr id="3" name="슬라이드 노트 개체 틀 2"/>
+          <p:cNvSpPr>
+            <a:spLocks noGrp="1"/>
+          </p:cNvSpPr>
+          <p:nvPr>
+            <p:ph type="body" idx="1"/>
+          </p:nvPr>
+        </p:nvSpPr>
+        <p:spPr/>
+        <p:txBody>
+          <a:bodyPr/>
+          <a:lstStyle/>
+          <a:p>
+            <a:r>
+              <a:rPr lang="ko-KR" altLang="en-US" dirty="0" err="1"/>
+              <a:t>임포트</a:t>
+            </a:r>
+            <a:r>
+              <a:rPr lang="ko-KR" altLang="en-US" dirty="0"/>
+              <a:t> 하는 것</a:t>
+            </a:r>
+            <a:endParaRPr lang="en-US" altLang="ko-KR" dirty="0"/>
+          </a:p>
+          <a:p>
+            <a:r>
+              <a:rPr lang="ko-KR" altLang="en-US" dirty="0" err="1"/>
+              <a:t>맵플롯라이브러리</a:t>
+            </a:r>
+            <a:r>
+              <a:rPr lang="ko-KR" altLang="en-US" dirty="0"/>
+              <a:t> 인라인 추가</a:t>
+            </a:r>
+            <a:endParaRPr lang="en-US" altLang="ko-KR" dirty="0"/>
+          </a:p>
+          <a:p>
+            <a:r>
+              <a:rPr lang="ko-KR" altLang="en-US" dirty="0"/>
+              <a:t>하지만 안되는 문제 발생 중</a:t>
+            </a:r>
+          </a:p>
+        </p:txBody>
+      </p:sp>
+      <p:sp>
+        <p:nvSpPr>
+          <p:cNvPr id="4" name="슬라이드 번호 개체 틀 3"/>
+          <p:cNvSpPr>
+            <a:spLocks noGrp="1"/>
+          </p:cNvSpPr>
+          <p:nvPr>
+            <p:ph type="sldNum" sz="quarter" idx="5"/>
+          </p:nvPr>
+        </p:nvSpPr>
+        <p:spPr/>
+        <p:txBody>
+          <a:bodyPr/>
+          <a:lstStyle/>
+          <a:p>
+            <a:fld id="{420F09F9-D812-4758-8566-A65BCCCBDD8F}" type="slidenum">
+              <a:rPr lang="ko-KR" altLang="en-US" smtClean="0"/>
+              <a:t>4</a:t>
+            </a:fld>
+            <a:endParaRPr lang="ko-KR" altLang="en-US"/>
+          </a:p>
+        </p:txBody>
+      </p:sp>
+    </p:spTree>
+    <p:extLst>
+      <p:ext uri="{BB962C8B-B14F-4D97-AF65-F5344CB8AC3E}">
+        <p14:creationId xmlns:p14="http://schemas.microsoft.com/office/powerpoint/2010/main" val="1424454977"/>
+      </p:ext>
+    </p:extLst>
+  </p:cSld>
+  <p:clrMapOvr>
+    <a:masterClrMapping/>
+  </p:clrMapOvr>
+</p:notes>
+</file>
+
+<file path=ppt/notesSlides/notesSlide4.xml><?xml version="1.0" encoding="utf-8"?>
+<p:notes xmlns:a="http://schemas.openxmlformats.org/drawingml/2006/main" xmlns:r="http://schemas.openxmlformats.org/officeDocument/2006/relationships" xmlns:p="http://schemas.openxmlformats.org/presentationml/2006/main">
+  <p:cSld>
+    <p:spTree>
+      <p:nvGrpSpPr>
+        <p:cNvPr id="1" name=""/>
+        <p:cNvGrpSpPr/>
+        <p:nvPr/>
+      </p:nvGrpSpPr>
+      <p:grpSpPr>
+        <a:xfrm>
+          <a:off x="0" y="0"/>
+          <a:ext cx="0" cy="0"/>
+          <a:chOff x="0" y="0"/>
+          <a:chExt cx="0" cy="0"/>
+        </a:xfrm>
+      </p:grpSpPr>
+      <p:sp>
+        <p:nvSpPr>
+          <p:cNvPr id="2" name="슬라이드 이미지 개체 틀 1"/>
+          <p:cNvSpPr>
+            <a:spLocks noGrp="1" noRot="1" noChangeAspect="1"/>
+          </p:cNvSpPr>
+          <p:nvPr>
+            <p:ph type="sldImg"/>
+          </p:nvPr>
+        </p:nvSpPr>
+        <p:spPr/>
+      </p:sp>
+      <p:sp>
+        <p:nvSpPr>
+          <p:cNvPr id="3" name="슬라이드 노트 개체 틀 2"/>
+          <p:cNvSpPr>
+            <a:spLocks noGrp="1"/>
+          </p:cNvSpPr>
+          <p:nvPr>
+            <p:ph type="body" idx="1"/>
+          </p:nvPr>
+        </p:nvSpPr>
+        <p:spPr/>
+        <p:txBody>
+          <a:bodyPr/>
+          <a:lstStyle/>
+          <a:p>
+            <a:r>
+              <a:rPr lang="ko-KR" altLang="en-US" dirty="0" err="1"/>
+              <a:t>브라이어는</a:t>
+            </a:r>
+            <a:r>
+              <a:rPr lang="ko-KR" altLang="en-US" dirty="0"/>
+              <a:t> 유닛 시스템을 지원하는데</a:t>
+            </a:r>
+            <a:r>
+              <a:rPr lang="en-US" altLang="ko-KR" dirty="0"/>
+              <a:t>, SNN </a:t>
+            </a:r>
+            <a:r>
+              <a:rPr lang="ko-KR" altLang="en-US" dirty="0"/>
+              <a:t>즉</a:t>
+            </a:r>
+            <a:r>
+              <a:rPr lang="en-US" altLang="ko-KR" dirty="0"/>
+              <a:t>, </a:t>
+            </a:r>
+            <a:r>
+              <a:rPr lang="ko-KR" altLang="en-US" dirty="0" err="1"/>
+              <a:t>뇌과학</a:t>
+            </a:r>
+            <a:r>
+              <a:rPr lang="ko-KR" altLang="en-US" dirty="0"/>
+              <a:t> 상에서 사용되는 단위와 계산을 지원함</a:t>
+            </a:r>
+            <a:endParaRPr lang="en-US" altLang="ko-KR" dirty="0"/>
+          </a:p>
+          <a:p>
+            <a:r>
+              <a:rPr lang="ko-KR" altLang="en-US" dirty="0"/>
+              <a:t>실제 단위처럼 표현됨</a:t>
+            </a:r>
+            <a:r>
+              <a:rPr lang="en-US" altLang="ko-KR" dirty="0"/>
+              <a:t>, </a:t>
+            </a:r>
+            <a:r>
+              <a:rPr lang="ko-KR" altLang="en-US" dirty="0"/>
+              <a:t>실제 출력임</a:t>
+            </a:r>
+            <a:r>
+              <a:rPr lang="en-US" altLang="ko-KR" dirty="0"/>
+              <a:t>, </a:t>
+            </a:r>
+            <a:r>
+              <a:rPr lang="ko-KR" altLang="en-US" dirty="0"/>
+              <a:t>단위를 읽기 편하다</a:t>
+            </a:r>
+          </a:p>
+        </p:txBody>
+      </p:sp>
+      <p:sp>
+        <p:nvSpPr>
+          <p:cNvPr id="4" name="슬라이드 번호 개체 틀 3"/>
+          <p:cNvSpPr>
+            <a:spLocks noGrp="1"/>
+          </p:cNvSpPr>
+          <p:nvPr>
+            <p:ph type="sldNum" sz="quarter" idx="5"/>
+          </p:nvPr>
+        </p:nvSpPr>
+        <p:spPr/>
+        <p:txBody>
+          <a:bodyPr/>
+          <a:lstStyle/>
+          <a:p>
+            <a:fld id="{420F09F9-D812-4758-8566-A65BCCCBDD8F}" type="slidenum">
+              <a:rPr lang="ko-KR" altLang="en-US" smtClean="0"/>
+              <a:t>5</a:t>
+            </a:fld>
+            <a:endParaRPr lang="ko-KR" altLang="en-US"/>
+          </a:p>
+        </p:txBody>
+      </p:sp>
+    </p:spTree>
+    <p:extLst>
+      <p:ext uri="{BB962C8B-B14F-4D97-AF65-F5344CB8AC3E}">
+        <p14:creationId xmlns:p14="http://schemas.microsoft.com/office/powerpoint/2010/main" val="4277467640"/>
+      </p:ext>
+    </p:extLst>
+  </p:cSld>
+  <p:clrMapOvr>
+    <a:masterClrMapping/>
+  </p:clrMapOvr>
+</p:notes>
+</file>
+
+<file path=ppt/notesSlides/notesSlide5.xml><?xml version="1.0" encoding="utf-8"?>
+<p:notes xmlns:a="http://schemas.openxmlformats.org/drawingml/2006/main" xmlns:r="http://schemas.openxmlformats.org/officeDocument/2006/relationships" xmlns:p="http://schemas.openxmlformats.org/presentationml/2006/main">
+  <p:cSld>
+    <p:spTree>
+      <p:nvGrpSpPr>
+        <p:cNvPr id="1" name=""/>
+        <p:cNvGrpSpPr/>
+        <p:nvPr/>
+      </p:nvGrpSpPr>
+      <p:grpSpPr>
+        <a:xfrm>
+          <a:off x="0" y="0"/>
+          <a:ext cx="0" cy="0"/>
+          <a:chOff x="0" y="0"/>
+          <a:chExt cx="0" cy="0"/>
+        </a:xfrm>
+      </p:grpSpPr>
+      <p:sp>
+        <p:nvSpPr>
+          <p:cNvPr id="2" name="슬라이드 이미지 개체 틀 1"/>
+          <p:cNvSpPr>
+            <a:spLocks noGrp="1" noRot="1" noChangeAspect="1"/>
+          </p:cNvSpPr>
+          <p:nvPr>
+            <p:ph type="sldImg"/>
+          </p:nvPr>
+        </p:nvSpPr>
+        <p:spPr/>
+      </p:sp>
+      <p:sp>
+        <p:nvSpPr>
+          <p:cNvPr id="3" name="슬라이드 노트 개체 틀 2"/>
+          <p:cNvSpPr>
+            <a:spLocks noGrp="1"/>
+          </p:cNvSpPr>
+          <p:nvPr>
+            <p:ph type="body" idx="1"/>
+          </p:nvPr>
+        </p:nvSpPr>
+        <p:spPr/>
+        <p:txBody>
+          <a:bodyPr/>
+          <a:lstStyle/>
+          <a:p>
+            <a:r>
+              <a:rPr lang="ko-KR" altLang="en-US" dirty="0"/>
+              <a:t>수식에 대한 연산도 가능하다</a:t>
+            </a:r>
+            <a:r>
+              <a:rPr lang="en-US" altLang="ko-KR" dirty="0"/>
+              <a:t>.</a:t>
+            </a:r>
+          </a:p>
+          <a:p>
+            <a:r>
+              <a:rPr lang="ko-KR" altLang="en-US" dirty="0"/>
+              <a:t>단</a:t>
+            </a:r>
+            <a:r>
+              <a:rPr lang="en-US" altLang="ko-KR" dirty="0"/>
+              <a:t>. </a:t>
+            </a:r>
+            <a:r>
+              <a:rPr lang="ko-KR" altLang="en-US" dirty="0"/>
+              <a:t>차원</a:t>
+            </a:r>
+            <a:r>
+              <a:rPr lang="en-US" altLang="ko-KR" dirty="0"/>
+              <a:t> </a:t>
+            </a:r>
+            <a:r>
+              <a:rPr lang="ko-KR" altLang="en-US" dirty="0"/>
+              <a:t>즉</a:t>
+            </a:r>
+            <a:r>
+              <a:rPr lang="en-US" altLang="ko-KR" dirty="0"/>
+              <a:t>, </a:t>
+            </a:r>
+            <a:r>
+              <a:rPr lang="ko-KR" altLang="en-US" dirty="0"/>
+              <a:t>단위가 맞아야 하며</a:t>
+            </a:r>
+            <a:r>
+              <a:rPr lang="en-US" altLang="ko-KR" dirty="0"/>
+              <a:t>, </a:t>
+            </a:r>
+            <a:r>
+              <a:rPr lang="ko-KR" altLang="en-US" dirty="0"/>
+              <a:t>맞지 않을 경우 </a:t>
+            </a:r>
+            <a:r>
+              <a:rPr lang="ko-KR" altLang="en-US" dirty="0" err="1"/>
+              <a:t>디멘션</a:t>
+            </a:r>
+            <a:r>
+              <a:rPr lang="ko-KR" altLang="en-US" dirty="0"/>
+              <a:t> 미스테이크 에러가 발생한다</a:t>
+            </a:r>
+            <a:r>
+              <a:rPr lang="en-US" altLang="ko-KR" dirty="0"/>
+              <a:t>.</a:t>
+            </a:r>
+          </a:p>
+          <a:p>
+            <a:r>
+              <a:rPr lang="ko-KR" altLang="en-US" dirty="0"/>
+              <a:t>공식 </a:t>
+            </a:r>
+            <a:r>
+              <a:rPr lang="ko-KR" altLang="en-US" dirty="0" err="1"/>
+              <a:t>튜토리얼에</a:t>
+            </a:r>
+            <a:r>
+              <a:rPr lang="ko-KR" altLang="en-US" dirty="0"/>
+              <a:t> 따르면 버그로 인해서 </a:t>
+            </a:r>
+            <a:r>
+              <a:rPr lang="ko-KR" altLang="en-US" dirty="0" err="1"/>
+              <a:t>디멘션</a:t>
+            </a:r>
+            <a:r>
+              <a:rPr lang="ko-KR" altLang="en-US" dirty="0"/>
+              <a:t> 미스테이크 에러가 발생할 수도 있지만</a:t>
+            </a:r>
+            <a:r>
+              <a:rPr lang="en-US" altLang="ko-KR" dirty="0"/>
+              <a:t>, </a:t>
+            </a:r>
+            <a:r>
+              <a:rPr lang="ko-KR" altLang="en-US" dirty="0"/>
+              <a:t>일반적으로 </a:t>
+            </a:r>
+            <a:r>
+              <a:rPr lang="ko-KR" altLang="en-US" dirty="0" err="1"/>
+              <a:t>스택트레이스를</a:t>
+            </a:r>
+            <a:r>
+              <a:rPr lang="ko-KR" altLang="en-US" dirty="0"/>
+              <a:t> 따라가면 단위가 맞지 않을 가능성이 높다고 한다</a:t>
+            </a:r>
+            <a:r>
+              <a:rPr lang="en-US" altLang="ko-KR" dirty="0"/>
+              <a:t>.</a:t>
+            </a:r>
+            <a:endParaRPr lang="ko-KR" altLang="en-US" dirty="0"/>
+          </a:p>
+        </p:txBody>
+      </p:sp>
+      <p:sp>
+        <p:nvSpPr>
+          <p:cNvPr id="4" name="슬라이드 번호 개체 틀 3"/>
+          <p:cNvSpPr>
+            <a:spLocks noGrp="1"/>
+          </p:cNvSpPr>
+          <p:nvPr>
+            <p:ph type="sldNum" sz="quarter" idx="5"/>
+          </p:nvPr>
+        </p:nvSpPr>
+        <p:spPr/>
+        <p:txBody>
+          <a:bodyPr/>
+          <a:lstStyle/>
+          <a:p>
+            <a:fld id="{420F09F9-D812-4758-8566-A65BCCCBDD8F}" type="slidenum">
+              <a:rPr lang="ko-KR" altLang="en-US" smtClean="0"/>
+              <a:t>6</a:t>
+            </a:fld>
+            <a:endParaRPr lang="ko-KR" altLang="en-US"/>
+          </a:p>
+        </p:txBody>
+      </p:sp>
+    </p:spTree>
+    <p:extLst>
+      <p:ext uri="{BB962C8B-B14F-4D97-AF65-F5344CB8AC3E}">
+        <p14:creationId xmlns:p14="http://schemas.microsoft.com/office/powerpoint/2010/main" val="294402919"/>
+      </p:ext>
+    </p:extLst>
+  </p:cSld>
+  <p:clrMapOvr>
+    <a:masterClrMapping/>
+  </p:clrMapOvr>
+</p:notes>
+</file>
+
+<file path=ppt/notesSlides/notesSlide6.xml><?xml version="1.0" encoding="utf-8"?>
+<p:notes xmlns:a="http://schemas.openxmlformats.org/drawingml/2006/main" xmlns:r="http://schemas.openxmlformats.org/officeDocument/2006/relationships" xmlns:p="http://schemas.openxmlformats.org/presentationml/2006/main">
+  <p:cSld>
+    <p:spTree>
+      <p:nvGrpSpPr>
+        <p:cNvPr id="1" name=""/>
+        <p:cNvGrpSpPr/>
+        <p:nvPr/>
+      </p:nvGrpSpPr>
+      <p:grpSpPr>
+        <a:xfrm>
+          <a:off x="0" y="0"/>
+          <a:ext cx="0" cy="0"/>
+          <a:chOff x="0" y="0"/>
+          <a:chExt cx="0" cy="0"/>
+        </a:xfrm>
+      </p:grpSpPr>
+      <p:sp>
+        <p:nvSpPr>
+          <p:cNvPr id="2" name="슬라이드 이미지 개체 틀 1"/>
+          <p:cNvSpPr>
+            <a:spLocks noGrp="1" noRot="1" noChangeAspect="1"/>
+          </p:cNvSpPr>
+          <p:nvPr>
+            <p:ph type="sldImg"/>
+          </p:nvPr>
+        </p:nvSpPr>
+        <p:spPr/>
+      </p:sp>
+      <p:sp>
+        <p:nvSpPr>
+          <p:cNvPr id="3" name="슬라이드 노트 개체 틀 2"/>
+          <p:cNvSpPr>
+            <a:spLocks noGrp="1"/>
+          </p:cNvSpPr>
+          <p:nvPr>
+            <p:ph type="body" idx="1"/>
+          </p:nvPr>
+        </p:nvSpPr>
+        <p:spPr/>
+        <p:txBody>
+          <a:bodyPr/>
+          <a:lstStyle/>
+          <a:p>
+            <a:r>
+              <a:rPr lang="ko-KR" altLang="en-US" dirty="0"/>
+              <a:t>미분 방정식 시스템을 이용하며</a:t>
+            </a:r>
+            <a:r>
+              <a:rPr lang="en-US" altLang="ko-KR" dirty="0"/>
+              <a:t>, </a:t>
+            </a:r>
+            <a:r>
+              <a:rPr lang="ko-KR" altLang="en-US" dirty="0"/>
+              <a:t>미분 방정식을 필수로 넣어주어야 한다</a:t>
+            </a:r>
+            <a:r>
+              <a:rPr lang="en-US" altLang="ko-KR" dirty="0"/>
+              <a:t>.</a:t>
+            </a:r>
+          </a:p>
+          <a:p>
+            <a:r>
+              <a:rPr lang="ko-KR" altLang="en-US" dirty="0"/>
+              <a:t>뉴런그룹이라는 클래스를 사용해 뉴런의 집단을 만듭니다</a:t>
+            </a:r>
+            <a:r>
+              <a:rPr lang="en-US" altLang="ko-KR" dirty="0"/>
+              <a:t>.</a:t>
+            </a:r>
+            <a:endParaRPr lang="ko-KR" altLang="en-US" dirty="0"/>
+          </a:p>
+        </p:txBody>
+      </p:sp>
+      <p:sp>
+        <p:nvSpPr>
+          <p:cNvPr id="4" name="슬라이드 번호 개체 틀 3"/>
+          <p:cNvSpPr>
+            <a:spLocks noGrp="1"/>
+          </p:cNvSpPr>
+          <p:nvPr>
+            <p:ph type="sldNum" sz="quarter" idx="5"/>
+          </p:nvPr>
+        </p:nvSpPr>
+        <p:spPr/>
+        <p:txBody>
+          <a:bodyPr/>
+          <a:lstStyle/>
+          <a:p>
+            <a:fld id="{420F09F9-D812-4758-8566-A65BCCCBDD8F}" type="slidenum">
+              <a:rPr lang="ko-KR" altLang="en-US" smtClean="0"/>
+              <a:t>7</a:t>
+            </a:fld>
+            <a:endParaRPr lang="ko-KR" altLang="en-US"/>
+          </a:p>
+        </p:txBody>
+      </p:sp>
+    </p:spTree>
+    <p:extLst>
+      <p:ext uri="{BB962C8B-B14F-4D97-AF65-F5344CB8AC3E}">
+        <p14:creationId xmlns:p14="http://schemas.microsoft.com/office/powerpoint/2010/main" val="134071702"/>
+      </p:ext>
+    </p:extLst>
+  </p:cSld>
+  <p:clrMapOvr>
+    <a:masterClrMapping/>
+  </p:clrMapOvr>
+</p:notes>
+</file>
+
+<file path=ppt/notesSlides/notesSlide7.xml><?xml version="1.0" encoding="utf-8"?>
+<p:notes xmlns:a="http://schemas.openxmlformats.org/drawingml/2006/main" xmlns:r="http://schemas.openxmlformats.org/officeDocument/2006/relationships" xmlns:p="http://schemas.openxmlformats.org/presentationml/2006/main">
+  <p:cSld>
+    <p:spTree>
+      <p:nvGrpSpPr>
+        <p:cNvPr id="1" name=""/>
+        <p:cNvGrpSpPr/>
+        <p:nvPr/>
+      </p:nvGrpSpPr>
+      <p:grpSpPr>
+        <a:xfrm>
+          <a:off x="0" y="0"/>
+          <a:ext cx="0" cy="0"/>
+          <a:chOff x="0" y="0"/>
+          <a:chExt cx="0" cy="0"/>
+        </a:xfrm>
+      </p:grpSpPr>
+      <p:sp>
+        <p:nvSpPr>
+          <p:cNvPr id="2" name="슬라이드 이미지 개체 틀 1"/>
+          <p:cNvSpPr>
+            <a:spLocks noGrp="1" noRot="1" noChangeAspect="1"/>
+          </p:cNvSpPr>
+          <p:nvPr>
+            <p:ph type="sldImg"/>
+          </p:nvPr>
+        </p:nvSpPr>
+        <p:spPr/>
+      </p:sp>
+      <p:sp>
+        <p:nvSpPr>
+          <p:cNvPr id="3" name="슬라이드 노트 개체 틀 2"/>
+          <p:cNvSpPr>
+            <a:spLocks noGrp="1"/>
+          </p:cNvSpPr>
+          <p:nvPr>
+            <p:ph type="body" idx="1"/>
+          </p:nvPr>
+        </p:nvSpPr>
+        <p:spPr/>
+        <p:txBody>
+          <a:bodyPr/>
+          <a:lstStyle/>
+          <a:p>
+            <a:r>
+              <a:rPr lang="ko-KR" altLang="en-US" dirty="0"/>
+              <a:t>미분방정식을 넣지 않았을 때에도 </a:t>
+            </a:r>
+            <a:r>
+              <a:rPr lang="ko-KR" altLang="en-US" dirty="0" err="1"/>
+              <a:t>디멘션미스테이크</a:t>
+            </a:r>
+            <a:r>
+              <a:rPr lang="ko-KR" altLang="en-US" dirty="0"/>
+              <a:t> 에러를 발생시킵니다</a:t>
+            </a:r>
+            <a:r>
+              <a:rPr lang="en-US" altLang="ko-KR" dirty="0"/>
+              <a:t>.</a:t>
+            </a:r>
+            <a:endParaRPr lang="ko-KR" altLang="en-US" dirty="0"/>
+          </a:p>
+        </p:txBody>
+      </p:sp>
+      <p:sp>
+        <p:nvSpPr>
+          <p:cNvPr id="4" name="슬라이드 번호 개체 틀 3"/>
+          <p:cNvSpPr>
+            <a:spLocks noGrp="1"/>
+          </p:cNvSpPr>
+          <p:nvPr>
+            <p:ph type="sldNum" sz="quarter" idx="5"/>
+          </p:nvPr>
+        </p:nvSpPr>
+        <p:spPr/>
+        <p:txBody>
+          <a:bodyPr/>
+          <a:lstStyle/>
+          <a:p>
+            <a:fld id="{420F09F9-D812-4758-8566-A65BCCCBDD8F}" type="slidenum">
+              <a:rPr lang="ko-KR" altLang="en-US" smtClean="0"/>
+              <a:t>8</a:t>
+            </a:fld>
+            <a:endParaRPr lang="ko-KR" altLang="en-US"/>
+          </a:p>
+        </p:txBody>
+      </p:sp>
+    </p:spTree>
+    <p:extLst>
+      <p:ext uri="{BB962C8B-B14F-4D97-AF65-F5344CB8AC3E}">
+        <p14:creationId xmlns:p14="http://schemas.microsoft.com/office/powerpoint/2010/main" val="941669805"/>
+      </p:ext>
+    </p:extLst>
+  </p:cSld>
+  <p:clrMapOvr>
+    <a:masterClrMapping/>
+  </p:clrMapOvr>
+</p:notes>
+</file>
+
+<file path=ppt/notesSlides/notesSlide8.xml><?xml version="1.0" encoding="utf-8"?>
+<p:notes xmlns:a="http://schemas.openxmlformats.org/drawingml/2006/main" xmlns:r="http://schemas.openxmlformats.org/officeDocument/2006/relationships" xmlns:p="http://schemas.openxmlformats.org/presentationml/2006/main">
+  <p:cSld>
+    <p:spTree>
+      <p:nvGrpSpPr>
+        <p:cNvPr id="1" name=""/>
+        <p:cNvGrpSpPr/>
+        <p:nvPr/>
+      </p:nvGrpSpPr>
+      <p:grpSpPr>
+        <a:xfrm>
+          <a:off x="0" y="0"/>
+          <a:ext cx="0" cy="0"/>
+          <a:chOff x="0" y="0"/>
+          <a:chExt cx="0" cy="0"/>
+        </a:xfrm>
+      </p:grpSpPr>
+      <p:sp>
+        <p:nvSpPr>
+          <p:cNvPr id="2" name="슬라이드 이미지 개체 틀 1"/>
+          <p:cNvSpPr>
+            <a:spLocks noGrp="1" noRot="1" noChangeAspect="1"/>
+          </p:cNvSpPr>
+          <p:nvPr>
+            <p:ph type="sldImg"/>
+          </p:nvPr>
+        </p:nvSpPr>
+        <p:spPr/>
+      </p:sp>
+      <p:sp>
+        <p:nvSpPr>
+          <p:cNvPr id="3" name="슬라이드 노트 개체 틀 2"/>
+          <p:cNvSpPr>
+            <a:spLocks noGrp="1"/>
+          </p:cNvSpPr>
+          <p:nvPr>
+            <p:ph type="body" idx="1"/>
+          </p:nvPr>
+        </p:nvSpPr>
+        <p:spPr/>
+        <p:txBody>
+          <a:bodyPr/>
+          <a:lstStyle/>
+          <a:p>
+            <a:r>
+              <a:rPr lang="ko-KR" altLang="en-US" dirty="0" err="1"/>
+              <a:t>뉴럴그룹의</a:t>
+            </a:r>
+            <a:r>
+              <a:rPr lang="ko-KR" altLang="en-US" dirty="0"/>
+              <a:t> 메소드 속성이 있는데</a:t>
+            </a:r>
+            <a:r>
+              <a:rPr lang="en-US" altLang="ko-KR" dirty="0"/>
+              <a:t>, </a:t>
+            </a:r>
+            <a:r>
+              <a:rPr lang="ko-KR" altLang="en-US" dirty="0"/>
+              <a:t>수치 적분 방법을 작성하는 부분이다</a:t>
+            </a:r>
+            <a:r>
+              <a:rPr lang="en-US" altLang="ko-KR" dirty="0"/>
+              <a:t>. </a:t>
+            </a:r>
+            <a:r>
+              <a:rPr lang="ko-KR" altLang="en-US" dirty="0"/>
+              <a:t>이 부분을 명시적으로 작성하지 않았을 때 </a:t>
+            </a:r>
+            <a:r>
+              <a:rPr lang="en-US" altLang="ko-KR" dirty="0"/>
+              <a:t>INFO </a:t>
+            </a:r>
+            <a:r>
+              <a:rPr lang="ko-KR" altLang="en-US" dirty="0"/>
+              <a:t>경고문이 출력된다</a:t>
+            </a:r>
+            <a:r>
+              <a:rPr lang="en-US" altLang="ko-KR" dirty="0"/>
+              <a:t>.</a:t>
+            </a:r>
+            <a:endParaRPr lang="ko-KR" altLang="en-US" dirty="0"/>
+          </a:p>
+        </p:txBody>
+      </p:sp>
+      <p:sp>
+        <p:nvSpPr>
+          <p:cNvPr id="4" name="슬라이드 번호 개체 틀 3"/>
+          <p:cNvSpPr>
+            <a:spLocks noGrp="1"/>
+          </p:cNvSpPr>
+          <p:nvPr>
+            <p:ph type="sldNum" sz="quarter" idx="5"/>
+          </p:nvPr>
+        </p:nvSpPr>
+        <p:spPr/>
+        <p:txBody>
+          <a:bodyPr/>
+          <a:lstStyle/>
+          <a:p>
+            <a:fld id="{420F09F9-D812-4758-8566-A65BCCCBDD8F}" type="slidenum">
+              <a:rPr lang="ko-KR" altLang="en-US" smtClean="0"/>
+              <a:t>9</a:t>
+            </a:fld>
+            <a:endParaRPr lang="ko-KR" altLang="en-US"/>
+          </a:p>
+        </p:txBody>
+      </p:sp>
+    </p:spTree>
+    <p:extLst>
+      <p:ext uri="{BB962C8B-B14F-4D97-AF65-F5344CB8AC3E}">
+        <p14:creationId xmlns:p14="http://schemas.microsoft.com/office/powerpoint/2010/main" val="482529864"/>
+      </p:ext>
+    </p:extLst>
+  </p:cSld>
+  <p:clrMapOvr>
+    <a:masterClrMapping/>
+  </p:clrMapOvr>
+</p:notes>
+</file>
+
+<file path=ppt/notesSlides/notesSlide9.xml><?xml version="1.0" encoding="utf-8"?>
+<p:notes xmlns:a="http://schemas.openxmlformats.org/drawingml/2006/main" xmlns:r="http://schemas.openxmlformats.org/officeDocument/2006/relationships" xmlns:p="http://schemas.openxmlformats.org/presentationml/2006/main">
+  <p:cSld>
+    <p:spTree>
+      <p:nvGrpSpPr>
+        <p:cNvPr id="1" name=""/>
+        <p:cNvGrpSpPr/>
+        <p:nvPr/>
+      </p:nvGrpSpPr>
+      <p:grpSpPr>
+        <a:xfrm>
+          <a:off x="0" y="0"/>
+          <a:ext cx="0" cy="0"/>
+          <a:chOff x="0" y="0"/>
+          <a:chExt cx="0" cy="0"/>
+        </a:xfrm>
+      </p:grpSpPr>
+      <p:sp>
+        <p:nvSpPr>
+          <p:cNvPr id="2" name="슬라이드 이미지 개체 틀 1"/>
+          <p:cNvSpPr>
+            <a:spLocks noGrp="1" noRot="1" noChangeAspect="1"/>
+          </p:cNvSpPr>
+          <p:nvPr>
+            <p:ph type="sldImg"/>
+          </p:nvPr>
+        </p:nvSpPr>
+        <p:spPr/>
+      </p:sp>
+      <p:sp>
+        <p:nvSpPr>
+          <p:cNvPr id="3" name="슬라이드 노트 개체 틀 2"/>
+          <p:cNvSpPr>
+            <a:spLocks noGrp="1"/>
+          </p:cNvSpPr>
+          <p:nvPr>
+            <p:ph type="body" idx="1"/>
+          </p:nvPr>
+        </p:nvSpPr>
+        <p:spPr/>
+        <p:txBody>
+          <a:bodyPr/>
+          <a:lstStyle/>
+          <a:p>
+            <a:r>
+              <a:rPr lang="ko-KR" altLang="en-US" dirty="0"/>
+              <a:t>간단한 뉴런 모델 실행 결과 계산된 </a:t>
+            </a:r>
+            <a:r>
+              <a:rPr lang="en-US" altLang="ko-KR" dirty="0"/>
+              <a:t>v, </a:t>
+            </a:r>
+            <a:r>
+              <a:rPr lang="ko-KR" altLang="en-US" dirty="0"/>
+              <a:t>즉 </a:t>
+            </a:r>
+            <a:r>
+              <a:rPr lang="ko-KR" altLang="en-US" dirty="0" err="1"/>
+              <a:t>막전위</a:t>
+            </a:r>
+            <a:r>
+              <a:rPr lang="ko-KR" altLang="en-US" dirty="0"/>
+              <a:t> 값이 직접 계산한 </a:t>
+            </a:r>
+            <a:r>
+              <a:rPr lang="ko-KR" altLang="en-US" dirty="0" err="1"/>
+              <a:t>막전위</a:t>
+            </a:r>
+            <a:r>
+              <a:rPr lang="ko-KR" altLang="en-US" dirty="0"/>
+              <a:t> 값과 같은 것을 알 수 있다</a:t>
+            </a:r>
+            <a:r>
+              <a:rPr lang="en-US" altLang="ko-KR" dirty="0"/>
+              <a:t>.</a:t>
+            </a:r>
+            <a:endParaRPr lang="ko-KR" altLang="en-US" dirty="0"/>
+          </a:p>
+        </p:txBody>
+      </p:sp>
+      <p:sp>
+        <p:nvSpPr>
+          <p:cNvPr id="4" name="슬라이드 번호 개체 틀 3"/>
+          <p:cNvSpPr>
+            <a:spLocks noGrp="1"/>
+          </p:cNvSpPr>
+          <p:nvPr>
+            <p:ph type="sldNum" sz="quarter" idx="5"/>
+          </p:nvPr>
+        </p:nvSpPr>
+        <p:spPr/>
+        <p:txBody>
+          <a:bodyPr/>
+          <a:lstStyle/>
+          <a:p>
+            <a:fld id="{420F09F9-D812-4758-8566-A65BCCCBDD8F}" type="slidenum">
+              <a:rPr lang="ko-KR" altLang="en-US" smtClean="0"/>
+              <a:t>10</a:t>
+            </a:fld>
+            <a:endParaRPr lang="ko-KR" altLang="en-US"/>
+          </a:p>
+        </p:txBody>
+      </p:sp>
+    </p:spTree>
+    <p:extLst>
+      <p:ext uri="{BB962C8B-B14F-4D97-AF65-F5344CB8AC3E}">
+        <p14:creationId xmlns:p14="http://schemas.microsoft.com/office/powerpoint/2010/main" val="180840674"/>
+      </p:ext>
+    </p:extLst>
+  </p:cSld>
+  <p:clrMapOvr>
+    <a:masterClrMapping/>
+  </p:clrMapOvr>
+</p:notes>
 </file>
 
 <file path=ppt/slideLayouts/slideLayout1.xml><?xml version="1.0" encoding="utf-8"?>
@@ -4385,7 +5574,7 @@
           </p:nvPr>
         </p:nvPicPr>
         <p:blipFill>
-          <a:blip r:embed="rId2"/>
+          <a:blip r:embed="rId3"/>
           <a:stretch>
             <a:fillRect/>
           </a:stretch>
@@ -4604,7 +5793,7 @@
           </p:nvPr>
         </p:nvPicPr>
         <p:blipFill>
-          <a:blip r:embed="rId2"/>
+          <a:blip r:embed="rId3"/>
           <a:stretch>
             <a:fillRect/>
           </a:stretch>
@@ -5983,7 +7172,7 @@
           </p:nvPr>
         </p:nvPicPr>
         <p:blipFill>
-          <a:blip r:embed="rId2"/>
+          <a:blip r:embed="rId3"/>
           <a:stretch>
             <a:fillRect/>
           </a:stretch>
@@ -6134,7 +7323,7 @@
           </p:nvPr>
         </p:nvPicPr>
         <p:blipFill>
-          <a:blip r:embed="rId2"/>
+          <a:blip r:embed="rId3"/>
           <a:stretch>
             <a:fillRect/>
           </a:stretch>
@@ -6271,7 +7460,7 @@
           </p:nvPr>
         </p:nvPicPr>
         <p:blipFill>
-          <a:blip r:embed="rId2"/>
+          <a:blip r:embed="rId3"/>
           <a:stretch>
             <a:fillRect/>
           </a:stretch>
@@ -6362,7 +7551,7 @@
           </p:nvPr>
         </p:nvPicPr>
         <p:blipFill>
-          <a:blip r:embed="rId2"/>
+          <a:blip r:embed="rId3"/>
           <a:stretch>
             <a:fillRect/>
           </a:stretch>
@@ -6517,7 +7706,7 @@
           </p:nvPr>
         </p:nvPicPr>
         <p:blipFill>
-          <a:blip r:embed="rId2"/>
+          <a:blip r:embed="rId3"/>
           <a:stretch>
             <a:fillRect/>
           </a:stretch>
@@ -6672,7 +7861,7 @@
           </p:nvPr>
         </p:nvPicPr>
         <p:blipFill>
-          <a:blip r:embed="rId2"/>
+          <a:blip r:embed="rId3"/>
           <a:stretch>
             <a:fillRect/>
           </a:stretch>
@@ -6827,7 +8016,7 @@
           </p:nvPr>
         </p:nvPicPr>
         <p:blipFill>
-          <a:blip r:embed="rId2"/>
+          <a:blip r:embed="rId3"/>
           <a:stretch>
             <a:fillRect/>
           </a:stretch>

</xml_diff>